<commit_message>
faq.html: fix image link and use more suitable size
</commit_message>
<xml_diff>
--- a/anwesende/static/images/seatname-example.pptx
+++ b/anwesende/static/images/seatname-example.pptx
@@ -104,6 +104,11 @@
       </a:defRPr>
     </a:lvl9pPr>
   </p:defaultTextStyle>
+  <p:extLst>
+    <p:ext uri="{EFAFB233-063F-42B5-8137-9DF3F51BA10A}">
+      <p15:sldGuideLst xmlns:p15="http://schemas.microsoft.com/office/powerpoint/2012/main"/>
+    </p:ext>
+  </p:extLst>
 </p:presentation>
 </file>
 
@@ -254,7 +259,7 @@
           <a:p>
             <a:fld id="{FAA2DD4F-0A7E-44CA-B52B-C484519E71F7}" type="datetimeFigureOut">
               <a:rPr lang="en-US" smtClean="0"/>
-              <a:t>2021-01-02</a:t>
+              <a:t>2021-01-06</a:t>
             </a:fld>
             <a:endParaRPr lang="en-US"/>
           </a:p>
@@ -452,7 +457,7 @@
           <a:p>
             <a:fld id="{FAA2DD4F-0A7E-44CA-B52B-C484519E71F7}" type="datetimeFigureOut">
               <a:rPr lang="en-US" smtClean="0"/>
-              <a:t>2021-01-02</a:t>
+              <a:t>2021-01-06</a:t>
             </a:fld>
             <a:endParaRPr lang="en-US"/>
           </a:p>
@@ -660,7 +665,7 @@
           <a:p>
             <a:fld id="{FAA2DD4F-0A7E-44CA-B52B-C484519E71F7}" type="datetimeFigureOut">
               <a:rPr lang="en-US" smtClean="0"/>
-              <a:t>2021-01-02</a:t>
+              <a:t>2021-01-06</a:t>
             </a:fld>
             <a:endParaRPr lang="en-US"/>
           </a:p>
@@ -858,7 +863,7 @@
           <a:p>
             <a:fld id="{FAA2DD4F-0A7E-44CA-B52B-C484519E71F7}" type="datetimeFigureOut">
               <a:rPr lang="en-US" smtClean="0"/>
-              <a:t>2021-01-02</a:t>
+              <a:t>2021-01-06</a:t>
             </a:fld>
             <a:endParaRPr lang="en-US"/>
           </a:p>
@@ -1133,7 +1138,7 @@
           <a:p>
             <a:fld id="{FAA2DD4F-0A7E-44CA-B52B-C484519E71F7}" type="datetimeFigureOut">
               <a:rPr lang="en-US" smtClean="0"/>
-              <a:t>2021-01-02</a:t>
+              <a:t>2021-01-06</a:t>
             </a:fld>
             <a:endParaRPr lang="en-US"/>
           </a:p>
@@ -1398,7 +1403,7 @@
           <a:p>
             <a:fld id="{FAA2DD4F-0A7E-44CA-B52B-C484519E71F7}" type="datetimeFigureOut">
               <a:rPr lang="en-US" smtClean="0"/>
-              <a:t>2021-01-02</a:t>
+              <a:t>2021-01-06</a:t>
             </a:fld>
             <a:endParaRPr lang="en-US"/>
           </a:p>
@@ -1810,7 +1815,7 @@
           <a:p>
             <a:fld id="{FAA2DD4F-0A7E-44CA-B52B-C484519E71F7}" type="datetimeFigureOut">
               <a:rPr lang="en-US" smtClean="0"/>
-              <a:t>2021-01-02</a:t>
+              <a:t>2021-01-06</a:t>
             </a:fld>
             <a:endParaRPr lang="en-US"/>
           </a:p>
@@ -1951,7 +1956,7 @@
           <a:p>
             <a:fld id="{FAA2DD4F-0A7E-44CA-B52B-C484519E71F7}" type="datetimeFigureOut">
               <a:rPr lang="en-US" smtClean="0"/>
-              <a:t>2021-01-02</a:t>
+              <a:t>2021-01-06</a:t>
             </a:fld>
             <a:endParaRPr lang="en-US"/>
           </a:p>
@@ -2064,7 +2069,7 @@
           <a:p>
             <a:fld id="{FAA2DD4F-0A7E-44CA-B52B-C484519E71F7}" type="datetimeFigureOut">
               <a:rPr lang="en-US" smtClean="0"/>
-              <a:t>2021-01-02</a:t>
+              <a:t>2021-01-06</a:t>
             </a:fld>
             <a:endParaRPr lang="en-US"/>
           </a:p>
@@ -2375,7 +2380,7 @@
           <a:p>
             <a:fld id="{FAA2DD4F-0A7E-44CA-B52B-C484519E71F7}" type="datetimeFigureOut">
               <a:rPr lang="en-US" smtClean="0"/>
-              <a:t>2021-01-02</a:t>
+              <a:t>2021-01-06</a:t>
             </a:fld>
             <a:endParaRPr lang="en-US"/>
           </a:p>
@@ -2663,7 +2668,7 @@
           <a:p>
             <a:fld id="{FAA2DD4F-0A7E-44CA-B52B-C484519E71F7}" type="datetimeFigureOut">
               <a:rPr lang="en-US" smtClean="0"/>
-              <a:t>2021-01-02</a:t>
+              <a:t>2021-01-06</a:t>
             </a:fld>
             <a:endParaRPr lang="en-US"/>
           </a:p>
@@ -2904,7 +2909,7 @@
           <a:p>
             <a:fld id="{FAA2DD4F-0A7E-44CA-B52B-C484519E71F7}" type="datetimeFigureOut">
               <a:rPr lang="en-US" smtClean="0"/>
-              <a:t>2021-01-02</a:t>
+              <a:t>2021-01-06</a:t>
             </a:fld>
             <a:endParaRPr lang="en-US"/>
           </a:p>
@@ -3335,7 +3340,7 @@
         </p:nvSpPr>
         <p:spPr>
           <a:xfrm>
-            <a:off x="1868928" y="287972"/>
+            <a:off x="1868928" y="375433"/>
             <a:ext cx="803531" cy="369332"/>
           </a:xfrm>
           <a:prstGeom prst="rect">
@@ -3389,7 +3394,7 @@
         </p:nvSpPr>
         <p:spPr>
           <a:xfrm>
-            <a:off x="546412" y="1122779"/>
+            <a:off x="546412" y="1210240"/>
             <a:ext cx="803531" cy="369332"/>
           </a:xfrm>
           <a:prstGeom prst="rect">
@@ -3443,7 +3448,7 @@
         </p:nvSpPr>
         <p:spPr>
           <a:xfrm>
-            <a:off x="2035743" y="1122779"/>
+            <a:off x="2035743" y="1210240"/>
             <a:ext cx="803531" cy="369332"/>
           </a:xfrm>
           <a:prstGeom prst="rect">
@@ -3497,7 +3502,7 @@
         </p:nvSpPr>
         <p:spPr>
           <a:xfrm>
-            <a:off x="3338318" y="1156970"/>
+            <a:off x="3338318" y="1244431"/>
             <a:ext cx="803531" cy="369332"/>
           </a:xfrm>
           <a:prstGeom prst="rect">
@@ -3551,7 +3556,7 @@
         </p:nvSpPr>
         <p:spPr>
           <a:xfrm>
-            <a:off x="4595307" y="1136323"/>
+            <a:off x="4595307" y="1223784"/>
             <a:ext cx="803531" cy="369332"/>
           </a:xfrm>
           <a:prstGeom prst="rect">
@@ -3579,7 +3584,7 @@
                   </a:schemeClr>
                 </a:solidFill>
               </a:rPr>
-              <a:t>r2.s4</a:t>
+              <a:t>r2s4</a:t>
             </a:r>
             <a:endParaRPr lang="en-US" dirty="0">
               <a:solidFill>
@@ -3605,7 +3610,7 @@
         </p:nvSpPr>
         <p:spPr>
           <a:xfrm>
-            <a:off x="1232211" y="2040393"/>
+            <a:off x="1232211" y="2127854"/>
             <a:ext cx="803531" cy="369332"/>
           </a:xfrm>
           <a:prstGeom prst="rect">
@@ -3659,7 +3664,7 @@
         </p:nvSpPr>
         <p:spPr>
           <a:xfrm>
-            <a:off x="2797743" y="2089824"/>
+            <a:off x="2797743" y="2177285"/>
             <a:ext cx="803531" cy="369332"/>
           </a:xfrm>
           <a:prstGeom prst="rect">
@@ -3713,7 +3718,7 @@
         </p:nvSpPr>
         <p:spPr>
           <a:xfrm>
-            <a:off x="4005511" y="2034361"/>
+            <a:off x="4005511" y="2121822"/>
             <a:ext cx="803531" cy="369332"/>
           </a:xfrm>
           <a:prstGeom prst="rect">
@@ -3767,7 +3772,7 @@
         </p:nvSpPr>
         <p:spPr>
           <a:xfrm>
-            <a:off x="471549" y="2962255"/>
+            <a:off x="471549" y="3049716"/>
             <a:ext cx="803531" cy="369332"/>
           </a:xfrm>
           <a:prstGeom prst="rect">
@@ -3821,7 +3826,7 @@
         </p:nvSpPr>
         <p:spPr>
           <a:xfrm>
-            <a:off x="1916051" y="2924155"/>
+            <a:off x="1916051" y="3011616"/>
             <a:ext cx="803531" cy="369332"/>
           </a:xfrm>
           <a:prstGeom prst="rect">
@@ -3875,7 +3880,7 @@
         </p:nvSpPr>
         <p:spPr>
           <a:xfrm>
-            <a:off x="4595306" y="2960586"/>
+            <a:off x="4595306" y="3048047"/>
             <a:ext cx="803531" cy="369332"/>
           </a:xfrm>
           <a:prstGeom prst="rect">
@@ -3929,7 +3934,7 @@
         </p:nvSpPr>
         <p:spPr>
           <a:xfrm>
-            <a:off x="3263009" y="2962255"/>
+            <a:off x="3263009" y="3049716"/>
             <a:ext cx="803531" cy="369332"/>
           </a:xfrm>
           <a:prstGeom prst="rect">
@@ -3983,7 +3988,7 @@
         </p:nvSpPr>
         <p:spPr>
           <a:xfrm>
-            <a:off x="1175062" y="3921183"/>
+            <a:off x="1175062" y="4008644"/>
             <a:ext cx="803531" cy="369332"/>
           </a:xfrm>
           <a:prstGeom prst="rect">
@@ -4037,7 +4042,7 @@
         </p:nvSpPr>
         <p:spPr>
           <a:xfrm>
-            <a:off x="2618161" y="3880623"/>
+            <a:off x="2618161" y="3968084"/>
             <a:ext cx="803531" cy="369332"/>
           </a:xfrm>
           <a:prstGeom prst="rect">
@@ -4091,7 +4096,7 @@
         </p:nvSpPr>
         <p:spPr>
           <a:xfrm>
-            <a:off x="4002148" y="3851314"/>
+            <a:off x="4002148" y="3938775"/>
             <a:ext cx="803531" cy="369332"/>
           </a:xfrm>
           <a:prstGeom prst="rect">
@@ -4146,7 +4151,7 @@
         <p:spPr>
           <a:xfrm>
             <a:off x="304800" y="146050"/>
-            <a:ext cx="5486400" cy="4654550"/>
+            <a:ext cx="5486400" cy="4537268"/>
           </a:xfrm>
           <a:prstGeom prst="rect">
             <a:avLst/>

</xml_diff>